<commit_message>
a lot of text
</commit_message>
<xml_diff>
--- a/Report/Xnor_popcount.pptx
+++ b/Report/Xnor_popcount.pptx
@@ -3356,7 +3356,7 @@
         </p:nvSpPr>
         <p:spPr>
           <a:xfrm>
-            <a:off x="2346960" y="403860"/>
+            <a:off x="2225040" y="617220"/>
             <a:ext cx="9631680" cy="360680"/>
           </a:xfrm>
           <a:prstGeom prst="rect">
@@ -3417,7 +3417,7 @@
         </p:nvSpPr>
         <p:spPr>
           <a:xfrm>
-            <a:off x="2346960" y="1140676"/>
+            <a:off x="2222500" y="1425048"/>
             <a:ext cx="9631680" cy="360680"/>
           </a:xfrm>
           <a:prstGeom prst="rect">
@@ -3478,8 +3478,8 @@
         </p:nvSpPr>
         <p:spPr>
           <a:xfrm flipV="1">
-            <a:off x="2346960" y="2799080"/>
-            <a:ext cx="9631680" cy="2021840"/>
+            <a:off x="2283460" y="3107796"/>
+            <a:ext cx="9509760" cy="1856741"/>
           </a:xfrm>
           <a:prstGeom prst="trapezoid">
             <a:avLst>
@@ -3538,7 +3538,7 @@
         </p:nvSpPr>
         <p:spPr>
           <a:xfrm>
-            <a:off x="5664200" y="5384800"/>
+            <a:off x="5542280" y="5598160"/>
             <a:ext cx="2997200" cy="457200"/>
           </a:xfrm>
           <a:prstGeom prst="rect">
@@ -3607,7 +3607,7 @@
         </p:nvSpPr>
         <p:spPr>
           <a:xfrm>
-            <a:off x="2346960" y="2082800"/>
+            <a:off x="2222500" y="2593556"/>
             <a:ext cx="9631680" cy="360680"/>
           </a:xfrm>
           <a:prstGeom prst="rect">
@@ -3668,7 +3668,7 @@
         </p:nvSpPr>
         <p:spPr>
           <a:xfrm>
-            <a:off x="547594" y="403860"/>
+            <a:off x="425674" y="617220"/>
             <a:ext cx="1699260" cy="360680"/>
           </a:xfrm>
           <a:prstGeom prst="rightArrow">
@@ -3726,7 +3726,7 @@
         </p:nvSpPr>
         <p:spPr>
           <a:xfrm>
-            <a:off x="570454" y="1140676"/>
+            <a:off x="448534" y="1425048"/>
             <a:ext cx="1676400" cy="360680"/>
           </a:xfrm>
           <a:prstGeom prst="rightArrow">
@@ -3784,8 +3784,8 @@
         </p:nvSpPr>
         <p:spPr>
           <a:xfrm flipH="1">
-            <a:off x="292100" y="5433060"/>
-            <a:ext cx="1488440" cy="360680"/>
+            <a:off x="425674" y="5646420"/>
+            <a:ext cx="1232946" cy="360680"/>
           </a:xfrm>
           <a:prstGeom prst="rightArrow">
             <a:avLst/>
@@ -3842,7 +3842,7 @@
         </p:nvSpPr>
         <p:spPr>
           <a:xfrm flipH="1">
-            <a:off x="4470400" y="5433060"/>
+            <a:off x="4348480" y="5646420"/>
             <a:ext cx="1097280" cy="360680"/>
           </a:xfrm>
           <a:prstGeom prst="rightArrow">
@@ -3900,7 +3900,7 @@
         </p:nvSpPr>
         <p:spPr>
           <a:xfrm>
-            <a:off x="2016760" y="5384800"/>
+            <a:off x="1894840" y="5598160"/>
             <a:ext cx="2357120" cy="457200"/>
           </a:xfrm>
           <a:prstGeom prst="rect">
@@ -3961,7 +3961,7 @@
         </p:nvSpPr>
         <p:spPr>
           <a:xfrm>
-            <a:off x="5100320" y="2799080"/>
+            <a:off x="4978400" y="3012440"/>
             <a:ext cx="4124960" cy="2021840"/>
           </a:xfrm>
           <a:prstGeom prst="trapezoid">
@@ -4026,7 +4026,7 @@
         </p:nvSpPr>
         <p:spPr>
           <a:xfrm rot="16200000" flipH="1">
-            <a:off x="6934200" y="4922520"/>
+            <a:off x="6812280" y="5082540"/>
             <a:ext cx="457200" cy="360680"/>
           </a:xfrm>
           <a:prstGeom prst="rightArrow">
@@ -4084,8 +4084,8 @@
         </p:nvSpPr>
         <p:spPr>
           <a:xfrm>
-            <a:off x="2016760" y="4069080"/>
-            <a:ext cx="1488440" cy="457200"/>
+            <a:off x="1894840" y="4843673"/>
+            <a:ext cx="1699260" cy="457200"/>
           </a:xfrm>
           <a:prstGeom prst="rect">
             <a:avLst/>
@@ -4126,21 +4126,8 @@
                   <a:sysClr val="windowText" lastClr="000000"/>
                 </a:solidFill>
               </a:rPr>
-              <a:t>Is valid </a:t>
-            </a:r>
-            <a:r>
-              <a:rPr lang="en-US" dirty="0" err="1">
-                <a:solidFill>
-                  <a:sysClr val="windowText" lastClr="000000"/>
-                </a:solidFill>
-              </a:rPr>
-              <a:t>lfsr</a:t>
-            </a:r>
-            <a:endParaRPr lang="en-US" dirty="0">
-              <a:solidFill>
-                <a:sysClr val="windowText" lastClr="000000"/>
-              </a:solidFill>
-            </a:endParaRPr>
+              <a:t>Is valid counter</a:t>
+            </a:r>
           </a:p>
         </p:txBody>
       </p:sp>
@@ -4158,8 +4145,8 @@
         </p:nvSpPr>
         <p:spPr>
           <a:xfrm flipH="1">
-            <a:off x="292100" y="4117340"/>
-            <a:ext cx="1488440" cy="360680"/>
+            <a:off x="448534" y="4891933"/>
+            <a:ext cx="1210086" cy="360680"/>
           </a:xfrm>
           <a:prstGeom prst="rightArrow">
             <a:avLst/>
@@ -4216,7 +4203,7 @@
         </p:nvSpPr>
         <p:spPr>
           <a:xfrm>
-            <a:off x="7037705" y="711508"/>
+            <a:off x="6913245" y="973489"/>
             <a:ext cx="250190" cy="461665"/>
           </a:xfrm>
           <a:prstGeom prst="rect">
@@ -4255,8 +4242,8 @@
         </p:nvSpPr>
         <p:spPr>
           <a:xfrm rot="5400000">
-            <a:off x="6982460" y="1672590"/>
-            <a:ext cx="360680" cy="360680"/>
+            <a:off x="6769735" y="2024272"/>
+            <a:ext cx="542290" cy="360680"/>
           </a:xfrm>
           <a:prstGeom prst="rightArrow">
             <a:avLst/>

</xml_diff>